<commit_message>
Added a slide that contains the table of what to send to the arduino
</commit_message>
<xml_diff>
--- a/images/Controller_layout.pptx
+++ b/images/Controller_layout.pptx
@@ -6,6 +6,7 @@
   </p:sldMasterIdLst>
   <p:sldIdLst>
     <p:sldId id="257" r:id="rId2"/>
+    <p:sldId id="258" r:id="rId3"/>
   </p:sldIdLst>
   <p:sldSz cx="12192000" cy="6858000"/>
   <p:notesSz cx="6858000" cy="9144000"/>
@@ -104,6 +105,11 @@
       </a:defRPr>
     </a:lvl9pPr>
   </p:defaultTextStyle>
+  <p:extLst>
+    <p:ext uri="{EFAFB233-063F-42B5-8137-9DF3F51BA10A}">
+      <p15:sldGuideLst xmlns:p15="http://schemas.microsoft.com/office/powerpoint/2012/main"/>
+    </p:ext>
+  </p:extLst>
 </p:presentation>
 </file>
 
@@ -4641,6 +4647,820 @@
 </p:sld>
 </file>
 
+<file path=ppt/slides/slide2.xml><?xml version="1.0" encoding="utf-8"?>
+<p:sld xmlns:a="http://schemas.openxmlformats.org/drawingml/2006/main" xmlns:r="http://schemas.openxmlformats.org/officeDocument/2006/relationships" xmlns:p="http://schemas.openxmlformats.org/presentationml/2006/main">
+  <p:cSld>
+    <p:spTree>
+      <p:nvGrpSpPr>
+        <p:cNvPr id="1" name=""/>
+        <p:cNvGrpSpPr/>
+        <p:nvPr/>
+      </p:nvGrpSpPr>
+      <p:grpSpPr>
+        <a:xfrm>
+          <a:off x="0" y="0"/>
+          <a:ext cx="0" cy="0"/>
+          <a:chOff x="0" y="0"/>
+          <a:chExt cx="0" cy="0"/>
+        </a:xfrm>
+      </p:grpSpPr>
+      <p:sp>
+        <p:nvSpPr>
+          <p:cNvPr id="2" name="Title 1">
+            <a:extLst>
+              <a:ext uri="{FF2B5EF4-FFF2-40B4-BE49-F238E27FC236}">
+                <a16:creationId xmlns:a16="http://schemas.microsoft.com/office/drawing/2014/main" id="{8A1C093C-0736-4DAA-8974-66BCD9799CA5}"/>
+              </a:ext>
+            </a:extLst>
+          </p:cNvPr>
+          <p:cNvSpPr>
+            <a:spLocks noGrp="1"/>
+          </p:cNvSpPr>
+          <p:nvPr>
+            <p:ph type="title"/>
+          </p:nvPr>
+        </p:nvSpPr>
+        <p:spPr/>
+        <p:txBody>
+          <a:bodyPr/>
+          <a:lstStyle/>
+          <a:p>
+            <a:r>
+              <a:rPr lang="en-CA" dirty="0"/>
+              <a:t>Commands sending to the Arduino</a:t>
+            </a:r>
+          </a:p>
+        </p:txBody>
+      </p:sp>
+      <p:graphicFrame>
+        <p:nvGraphicFramePr>
+          <p:cNvPr id="4" name="Content Placeholder 3">
+            <a:extLst>
+              <a:ext uri="{FF2B5EF4-FFF2-40B4-BE49-F238E27FC236}">
+                <a16:creationId xmlns:a16="http://schemas.microsoft.com/office/drawing/2014/main" id="{B2FCC273-E2C3-471E-A04F-664094411502}"/>
+              </a:ext>
+            </a:extLst>
+          </p:cNvPr>
+          <p:cNvGraphicFramePr>
+            <a:graphicFrameLocks noGrp="1"/>
+          </p:cNvGraphicFramePr>
+          <p:nvPr>
+            <p:ph idx="1"/>
+            <p:extLst>
+              <p:ext uri="{D42A27DB-BD31-4B8C-83A1-F6EECF244321}">
+                <p14:modId xmlns:p14="http://schemas.microsoft.com/office/powerpoint/2010/main" val="743732604"/>
+              </p:ext>
+            </p:extLst>
+          </p:nvPr>
+        </p:nvGraphicFramePr>
+        <p:xfrm>
+          <a:off x="838200" y="1825625"/>
+          <a:ext cx="10515600" cy="3708400"/>
+        </p:xfrm>
+        <a:graphic>
+          <a:graphicData uri="http://schemas.openxmlformats.org/drawingml/2006/table">
+            <a:tbl>
+              <a:tblPr firstRow="1" bandRow="1">
+                <a:tableStyleId>{5C22544A-7EE6-4342-B048-85BDC9FD1C3A}</a:tableStyleId>
+              </a:tblPr>
+              <a:tblGrid>
+                <a:gridCol w="2103120">
+                  <a:extLst>
+                    <a:ext uri="{9D8B030D-6E8A-4147-A177-3AD203B41FA5}">
+                      <a16:colId xmlns:a16="http://schemas.microsoft.com/office/drawing/2014/main" val="3769223371"/>
+                    </a:ext>
+                  </a:extLst>
+                </a:gridCol>
+                <a:gridCol w="2103120">
+                  <a:extLst>
+                    <a:ext uri="{9D8B030D-6E8A-4147-A177-3AD203B41FA5}">
+                      <a16:colId xmlns:a16="http://schemas.microsoft.com/office/drawing/2014/main" val="3908358758"/>
+                    </a:ext>
+                  </a:extLst>
+                </a:gridCol>
+                <a:gridCol w="2103120">
+                  <a:extLst>
+                    <a:ext uri="{9D8B030D-6E8A-4147-A177-3AD203B41FA5}">
+                      <a16:colId xmlns:a16="http://schemas.microsoft.com/office/drawing/2014/main" val="2172164165"/>
+                    </a:ext>
+                  </a:extLst>
+                </a:gridCol>
+                <a:gridCol w="2103120">
+                  <a:extLst>
+                    <a:ext uri="{9D8B030D-6E8A-4147-A177-3AD203B41FA5}">
+                      <a16:colId xmlns:a16="http://schemas.microsoft.com/office/drawing/2014/main" val="4170774790"/>
+                    </a:ext>
+                  </a:extLst>
+                </a:gridCol>
+                <a:gridCol w="2103120">
+                  <a:extLst>
+                    <a:ext uri="{9D8B030D-6E8A-4147-A177-3AD203B41FA5}">
+                      <a16:colId xmlns:a16="http://schemas.microsoft.com/office/drawing/2014/main" val="1129860999"/>
+                    </a:ext>
+                  </a:extLst>
+                </a:gridCol>
+              </a:tblGrid>
+              <a:tr h="370840">
+                <a:tc>
+                  <a:txBody>
+                    <a:bodyPr/>
+                    <a:lstStyle/>
+                    <a:p>
+                      <a:r>
+                        <a:rPr lang="en-CA" dirty="0"/>
+                        <a:t>Description</a:t>
+                      </a:r>
+                    </a:p>
+                  </a:txBody>
+                  <a:tcPr/>
+                </a:tc>
+                <a:tc>
+                  <a:txBody>
+                    <a:bodyPr/>
+                    <a:lstStyle/>
+                    <a:p>
+                      <a:r>
+                        <a:rPr lang="en-CA" dirty="0"/>
+                        <a:t>Mode</a:t>
+                      </a:r>
+                    </a:p>
+                  </a:txBody>
+                  <a:tcPr/>
+                </a:tc>
+                <a:tc>
+                  <a:txBody>
+                    <a:bodyPr/>
+                    <a:lstStyle/>
+                    <a:p>
+                      <a:r>
+                        <a:rPr lang="en-CA" dirty="0"/>
+                        <a:t>Value -</a:t>
+                      </a:r>
+                    </a:p>
+                  </a:txBody>
+                  <a:tcPr/>
+                </a:tc>
+                <a:tc>
+                  <a:txBody>
+                    <a:bodyPr/>
+                    <a:lstStyle/>
+                    <a:p>
+                      <a:r>
+                        <a:rPr lang="en-CA" dirty="0"/>
+                        <a:t>Value +</a:t>
+                      </a:r>
+                    </a:p>
+                  </a:txBody>
+                  <a:tcPr/>
+                </a:tc>
+                <a:tc>
+                  <a:txBody>
+                    <a:bodyPr/>
+                    <a:lstStyle/>
+                    <a:p>
+                      <a:r>
+                        <a:rPr lang="en-CA" dirty="0"/>
+                        <a:t>Note</a:t>
+                      </a:r>
+                    </a:p>
+                  </a:txBody>
+                  <a:tcPr/>
+                </a:tc>
+                <a:extLst>
+                  <a:ext uri="{0D108BD9-81ED-4DB2-BD59-A6C34878D82A}">
+                    <a16:rowId xmlns:a16="http://schemas.microsoft.com/office/drawing/2014/main" val="1604317501"/>
+                  </a:ext>
+                </a:extLst>
+              </a:tr>
+              <a:tr h="370840">
+                <a:tc>
+                  <a:txBody>
+                    <a:bodyPr/>
+                    <a:lstStyle/>
+                    <a:p>
+                      <a:r>
+                        <a:rPr lang="en-CA" dirty="0"/>
+                        <a:t>Rotate Velocity</a:t>
+                      </a:r>
+                    </a:p>
+                  </a:txBody>
+                  <a:tcPr/>
+                </a:tc>
+                <a:tc>
+                  <a:txBody>
+                    <a:bodyPr/>
+                    <a:lstStyle/>
+                    <a:p>
+                      <a:r>
+                        <a:rPr lang="en-CA" dirty="0"/>
+                        <a:t>0</a:t>
+                      </a:r>
+                    </a:p>
+                  </a:txBody>
+                  <a:tcPr/>
+                </a:tc>
+                <a:tc>
+                  <a:txBody>
+                    <a:bodyPr/>
+                    <a:lstStyle/>
+                    <a:p>
+                      <a:r>
+                        <a:rPr lang="en-CA" dirty="0"/>
+                        <a:t>Rotate -</a:t>
+                      </a:r>
+                    </a:p>
+                  </a:txBody>
+                  <a:tcPr/>
+                </a:tc>
+                <a:tc>
+                  <a:txBody>
+                    <a:bodyPr/>
+                    <a:lstStyle/>
+                    <a:p>
+                      <a:r>
+                        <a:rPr lang="en-CA" dirty="0"/>
+                        <a:t>Rotate+</a:t>
+                      </a:r>
+                    </a:p>
+                  </a:txBody>
+                  <a:tcPr/>
+                </a:tc>
+                <a:tc>
+                  <a:txBody>
+                    <a:bodyPr/>
+                    <a:lstStyle/>
+                    <a:p>
+                      <a:endParaRPr lang="en-CA"/>
+                    </a:p>
+                  </a:txBody>
+                  <a:tcPr/>
+                </a:tc>
+                <a:extLst>
+                  <a:ext uri="{0D108BD9-81ED-4DB2-BD59-A6C34878D82A}">
+                    <a16:rowId xmlns:a16="http://schemas.microsoft.com/office/drawing/2014/main" val="2183484033"/>
+                  </a:ext>
+                </a:extLst>
+              </a:tr>
+              <a:tr h="370840">
+                <a:tc>
+                  <a:txBody>
+                    <a:bodyPr/>
+                    <a:lstStyle/>
+                    <a:p>
+                      <a:r>
+                        <a:rPr lang="en-CA" dirty="0"/>
+                        <a:t>Lower Velocity</a:t>
+                      </a:r>
+                    </a:p>
+                  </a:txBody>
+                  <a:tcPr/>
+                </a:tc>
+                <a:tc>
+                  <a:txBody>
+                    <a:bodyPr/>
+                    <a:lstStyle/>
+                    <a:p>
+                      <a:r>
+                        <a:rPr lang="en-CA" dirty="0"/>
+                        <a:t>1</a:t>
+                      </a:r>
+                    </a:p>
+                  </a:txBody>
+                  <a:tcPr/>
+                </a:tc>
+                <a:tc>
+                  <a:txBody>
+                    <a:bodyPr/>
+                    <a:lstStyle/>
+                    <a:p>
+                      <a:r>
+                        <a:rPr lang="en-CA" dirty="0"/>
+                        <a:t>Lower -</a:t>
+                      </a:r>
+                    </a:p>
+                  </a:txBody>
+                  <a:tcPr/>
+                </a:tc>
+                <a:tc>
+                  <a:txBody>
+                    <a:bodyPr/>
+                    <a:lstStyle/>
+                    <a:p>
+                      <a:r>
+                        <a:rPr lang="en-CA" dirty="0"/>
+                        <a:t>Lower +</a:t>
+                      </a:r>
+                    </a:p>
+                  </a:txBody>
+                  <a:tcPr/>
+                </a:tc>
+                <a:tc>
+                  <a:txBody>
+                    <a:bodyPr/>
+                    <a:lstStyle/>
+                    <a:p>
+                      <a:endParaRPr lang="en-CA"/>
+                    </a:p>
+                  </a:txBody>
+                  <a:tcPr/>
+                </a:tc>
+                <a:extLst>
+                  <a:ext uri="{0D108BD9-81ED-4DB2-BD59-A6C34878D82A}">
+                    <a16:rowId xmlns:a16="http://schemas.microsoft.com/office/drawing/2014/main" val="1635579836"/>
+                  </a:ext>
+                </a:extLst>
+              </a:tr>
+              <a:tr h="370840">
+                <a:tc>
+                  <a:txBody>
+                    <a:bodyPr/>
+                    <a:lstStyle/>
+                    <a:p>
+                      <a:r>
+                        <a:rPr lang="en-CA" dirty="0"/>
+                        <a:t>Upper Velocity</a:t>
+                      </a:r>
+                    </a:p>
+                  </a:txBody>
+                  <a:tcPr/>
+                </a:tc>
+                <a:tc>
+                  <a:txBody>
+                    <a:bodyPr/>
+                    <a:lstStyle/>
+                    <a:p>
+                      <a:r>
+                        <a:rPr lang="en-CA" dirty="0"/>
+                        <a:t>2</a:t>
+                      </a:r>
+                    </a:p>
+                  </a:txBody>
+                  <a:tcPr/>
+                </a:tc>
+                <a:tc>
+                  <a:txBody>
+                    <a:bodyPr/>
+                    <a:lstStyle/>
+                    <a:p>
+                      <a:r>
+                        <a:rPr lang="en-CA" dirty="0"/>
+                        <a:t>Upper -</a:t>
+                      </a:r>
+                    </a:p>
+                  </a:txBody>
+                  <a:tcPr/>
+                </a:tc>
+                <a:tc>
+                  <a:txBody>
+                    <a:bodyPr/>
+                    <a:lstStyle/>
+                    <a:p>
+                      <a:r>
+                        <a:rPr lang="en-CA" dirty="0"/>
+                        <a:t>Upper +</a:t>
+                      </a:r>
+                    </a:p>
+                  </a:txBody>
+                  <a:tcPr/>
+                </a:tc>
+                <a:tc>
+                  <a:txBody>
+                    <a:bodyPr/>
+                    <a:lstStyle/>
+                    <a:p>
+                      <a:endParaRPr lang="en-CA"/>
+                    </a:p>
+                  </a:txBody>
+                  <a:tcPr/>
+                </a:tc>
+                <a:extLst>
+                  <a:ext uri="{0D108BD9-81ED-4DB2-BD59-A6C34878D82A}">
+                    <a16:rowId xmlns:a16="http://schemas.microsoft.com/office/drawing/2014/main" val="725317762"/>
+                  </a:ext>
+                </a:extLst>
+              </a:tr>
+              <a:tr h="370840">
+                <a:tc>
+                  <a:txBody>
+                    <a:bodyPr/>
+                    <a:lstStyle/>
+                    <a:p>
+                      <a:r>
+                        <a:rPr lang="en-CA" dirty="0"/>
+                        <a:t>Gripper Velocity</a:t>
+                      </a:r>
+                    </a:p>
+                  </a:txBody>
+                  <a:tcPr/>
+                </a:tc>
+                <a:tc>
+                  <a:txBody>
+                    <a:bodyPr/>
+                    <a:lstStyle/>
+                    <a:p>
+                      <a:r>
+                        <a:rPr lang="en-CA" dirty="0"/>
+                        <a:t>3</a:t>
+                      </a:r>
+                    </a:p>
+                  </a:txBody>
+                  <a:tcPr/>
+                </a:tc>
+                <a:tc>
+                  <a:txBody>
+                    <a:bodyPr/>
+                    <a:lstStyle/>
+                    <a:p>
+                      <a:r>
+                        <a:rPr lang="en-CA" dirty="0"/>
+                        <a:t>Gripper -</a:t>
+                      </a:r>
+                    </a:p>
+                  </a:txBody>
+                  <a:tcPr/>
+                </a:tc>
+                <a:tc>
+                  <a:txBody>
+                    <a:bodyPr/>
+                    <a:lstStyle/>
+                    <a:p>
+                      <a:r>
+                        <a:rPr lang="en-CA" dirty="0"/>
+                        <a:t>Gripper +</a:t>
+                      </a:r>
+                    </a:p>
+                  </a:txBody>
+                  <a:tcPr/>
+                </a:tc>
+                <a:tc>
+                  <a:txBody>
+                    <a:bodyPr/>
+                    <a:lstStyle/>
+                    <a:p>
+                      <a:endParaRPr lang="en-CA"/>
+                    </a:p>
+                  </a:txBody>
+                  <a:tcPr/>
+                </a:tc>
+                <a:extLst>
+                  <a:ext uri="{0D108BD9-81ED-4DB2-BD59-A6C34878D82A}">
+                    <a16:rowId xmlns:a16="http://schemas.microsoft.com/office/drawing/2014/main" val="2116403849"/>
+                  </a:ext>
+                </a:extLst>
+              </a:tr>
+              <a:tr h="370840">
+                <a:tc>
+                  <a:txBody>
+                    <a:bodyPr/>
+                    <a:lstStyle/>
+                    <a:p>
+                      <a:r>
+                        <a:rPr lang="en-CA" dirty="0"/>
+                        <a:t>Rotate Position</a:t>
+                      </a:r>
+                    </a:p>
+                  </a:txBody>
+                  <a:tcPr/>
+                </a:tc>
+                <a:tc>
+                  <a:txBody>
+                    <a:bodyPr/>
+                    <a:lstStyle/>
+                    <a:p>
+                      <a:r>
+                        <a:rPr lang="en-CA" dirty="0"/>
+                        <a:t>4</a:t>
+                      </a:r>
+                    </a:p>
+                  </a:txBody>
+                  <a:tcPr/>
+                </a:tc>
+                <a:tc>
+                  <a:txBody>
+                    <a:bodyPr/>
+                    <a:lstStyle/>
+                    <a:p>
+                      <a:r>
+                        <a:rPr lang="en-CA" dirty="0" err="1"/>
+                        <a:t>Angle_H</a:t>
+                      </a:r>
+                      <a:endParaRPr lang="en-CA" dirty="0"/>
+                    </a:p>
+                  </a:txBody>
+                  <a:tcPr/>
+                </a:tc>
+                <a:tc>
+                  <a:txBody>
+                    <a:bodyPr/>
+                    <a:lstStyle/>
+                    <a:p>
+                      <a:r>
+                        <a:rPr lang="en-CA" dirty="0" err="1"/>
+                        <a:t>Angle_L</a:t>
+                      </a:r>
+                      <a:endParaRPr lang="en-CA" dirty="0"/>
+                    </a:p>
+                  </a:txBody>
+                  <a:tcPr/>
+                </a:tc>
+                <a:tc>
+                  <a:txBody>
+                    <a:bodyPr/>
+                    <a:lstStyle/>
+                    <a:p>
+                      <a:r>
+                        <a:rPr lang="en-CA" dirty="0"/>
+                        <a:t>Angle(0,65536)</a:t>
+                      </a:r>
+                    </a:p>
+                  </a:txBody>
+                  <a:tcPr/>
+                </a:tc>
+                <a:extLst>
+                  <a:ext uri="{0D108BD9-81ED-4DB2-BD59-A6C34878D82A}">
+                    <a16:rowId xmlns:a16="http://schemas.microsoft.com/office/drawing/2014/main" val="2743854425"/>
+                  </a:ext>
+                </a:extLst>
+              </a:tr>
+              <a:tr h="370840">
+                <a:tc>
+                  <a:txBody>
+                    <a:bodyPr/>
+                    <a:lstStyle/>
+                    <a:p>
+                      <a:r>
+                        <a:rPr lang="en-CA" dirty="0"/>
+                        <a:t>Lower Position</a:t>
+                      </a:r>
+                    </a:p>
+                  </a:txBody>
+                  <a:tcPr/>
+                </a:tc>
+                <a:tc>
+                  <a:txBody>
+                    <a:bodyPr/>
+                    <a:lstStyle/>
+                    <a:p>
+                      <a:r>
+                        <a:rPr lang="en-CA" dirty="0"/>
+                        <a:t>5</a:t>
+                      </a:r>
+                    </a:p>
+                  </a:txBody>
+                  <a:tcPr/>
+                </a:tc>
+                <a:tc>
+                  <a:txBody>
+                    <a:bodyPr/>
+                    <a:lstStyle/>
+                    <a:p>
+                      <a:r>
+                        <a:rPr lang="en-CA" dirty="0" err="1"/>
+                        <a:t>Angle_H</a:t>
+                      </a:r>
+                      <a:endParaRPr lang="en-CA" dirty="0"/>
+                    </a:p>
+                  </a:txBody>
+                  <a:tcPr/>
+                </a:tc>
+                <a:tc>
+                  <a:txBody>
+                    <a:bodyPr/>
+                    <a:lstStyle/>
+                    <a:p>
+                      <a:r>
+                        <a:rPr lang="en-CA" dirty="0" err="1"/>
+                        <a:t>Angle_L</a:t>
+                      </a:r>
+                      <a:endParaRPr lang="en-CA" dirty="0"/>
+                    </a:p>
+                  </a:txBody>
+                  <a:tcPr/>
+                </a:tc>
+                <a:tc>
+                  <a:txBody>
+                    <a:bodyPr/>
+                    <a:lstStyle/>
+                    <a:p>
+                      <a:endParaRPr lang="en-CA" dirty="0"/>
+                    </a:p>
+                  </a:txBody>
+                  <a:tcPr/>
+                </a:tc>
+                <a:extLst>
+                  <a:ext uri="{0D108BD9-81ED-4DB2-BD59-A6C34878D82A}">
+                    <a16:rowId xmlns:a16="http://schemas.microsoft.com/office/drawing/2014/main" val="3567386369"/>
+                  </a:ext>
+                </a:extLst>
+              </a:tr>
+              <a:tr h="370840">
+                <a:tc>
+                  <a:txBody>
+                    <a:bodyPr/>
+                    <a:lstStyle/>
+                    <a:p>
+                      <a:r>
+                        <a:rPr lang="en-CA" dirty="0"/>
+                        <a:t>Upper Position</a:t>
+                      </a:r>
+                    </a:p>
+                  </a:txBody>
+                  <a:tcPr/>
+                </a:tc>
+                <a:tc>
+                  <a:txBody>
+                    <a:bodyPr/>
+                    <a:lstStyle/>
+                    <a:p>
+                      <a:r>
+                        <a:rPr lang="en-CA" dirty="0"/>
+                        <a:t>6</a:t>
+                      </a:r>
+                    </a:p>
+                  </a:txBody>
+                  <a:tcPr/>
+                </a:tc>
+                <a:tc>
+                  <a:txBody>
+                    <a:bodyPr/>
+                    <a:lstStyle/>
+                    <a:p>
+                      <a:r>
+                        <a:rPr lang="en-CA" dirty="0" err="1"/>
+                        <a:t>Angle_H</a:t>
+                      </a:r>
+                      <a:endParaRPr lang="en-CA" dirty="0"/>
+                    </a:p>
+                  </a:txBody>
+                  <a:tcPr/>
+                </a:tc>
+                <a:tc>
+                  <a:txBody>
+                    <a:bodyPr/>
+                    <a:lstStyle/>
+                    <a:p>
+                      <a:r>
+                        <a:rPr lang="en-CA" dirty="0" err="1"/>
+                        <a:t>Angle_L</a:t>
+                      </a:r>
+                      <a:endParaRPr lang="en-CA" dirty="0"/>
+                    </a:p>
+                  </a:txBody>
+                  <a:tcPr/>
+                </a:tc>
+                <a:tc>
+                  <a:txBody>
+                    <a:bodyPr/>
+                    <a:lstStyle/>
+                    <a:p>
+                      <a:endParaRPr lang="en-CA"/>
+                    </a:p>
+                  </a:txBody>
+                  <a:tcPr/>
+                </a:tc>
+                <a:extLst>
+                  <a:ext uri="{0D108BD9-81ED-4DB2-BD59-A6C34878D82A}">
+                    <a16:rowId xmlns:a16="http://schemas.microsoft.com/office/drawing/2014/main" val="3516042039"/>
+                  </a:ext>
+                </a:extLst>
+              </a:tr>
+              <a:tr h="370840">
+                <a:tc>
+                  <a:txBody>
+                    <a:bodyPr/>
+                    <a:lstStyle/>
+                    <a:p>
+                      <a:endParaRPr lang="en-CA"/>
+                    </a:p>
+                  </a:txBody>
+                  <a:tcPr/>
+                </a:tc>
+                <a:tc>
+                  <a:txBody>
+                    <a:bodyPr/>
+                    <a:lstStyle/>
+                    <a:p>
+                      <a:r>
+                        <a:rPr lang="en-CA" dirty="0"/>
+                        <a:t>7</a:t>
+                      </a:r>
+                    </a:p>
+                  </a:txBody>
+                  <a:tcPr/>
+                </a:tc>
+                <a:tc>
+                  <a:txBody>
+                    <a:bodyPr/>
+                    <a:lstStyle/>
+                    <a:p>
+                      <a:endParaRPr lang="en-CA"/>
+                    </a:p>
+                  </a:txBody>
+                  <a:tcPr/>
+                </a:tc>
+                <a:tc>
+                  <a:txBody>
+                    <a:bodyPr/>
+                    <a:lstStyle/>
+                    <a:p>
+                      <a:endParaRPr lang="en-CA"/>
+                    </a:p>
+                  </a:txBody>
+                  <a:tcPr/>
+                </a:tc>
+                <a:tc>
+                  <a:txBody>
+                    <a:bodyPr/>
+                    <a:lstStyle/>
+                    <a:p>
+                      <a:endParaRPr lang="en-CA"/>
+                    </a:p>
+                  </a:txBody>
+                  <a:tcPr/>
+                </a:tc>
+                <a:extLst>
+                  <a:ext uri="{0D108BD9-81ED-4DB2-BD59-A6C34878D82A}">
+                    <a16:rowId xmlns:a16="http://schemas.microsoft.com/office/drawing/2014/main" val="373341903"/>
+                  </a:ext>
+                </a:extLst>
+              </a:tr>
+              <a:tr h="370840">
+                <a:tc>
+                  <a:txBody>
+                    <a:bodyPr/>
+                    <a:lstStyle/>
+                    <a:p>
+                      <a:endParaRPr lang="en-CA"/>
+                    </a:p>
+                  </a:txBody>
+                  <a:tcPr/>
+                </a:tc>
+                <a:tc>
+                  <a:txBody>
+                    <a:bodyPr/>
+                    <a:lstStyle/>
+                    <a:p>
+                      <a:r>
+                        <a:rPr lang="en-CA" dirty="0"/>
+                        <a:t>8</a:t>
+                      </a:r>
+                    </a:p>
+                  </a:txBody>
+                  <a:tcPr/>
+                </a:tc>
+                <a:tc>
+                  <a:txBody>
+                    <a:bodyPr/>
+                    <a:lstStyle/>
+                    <a:p>
+                      <a:endParaRPr lang="en-CA"/>
+                    </a:p>
+                  </a:txBody>
+                  <a:tcPr/>
+                </a:tc>
+                <a:tc>
+                  <a:txBody>
+                    <a:bodyPr/>
+                    <a:lstStyle/>
+                    <a:p>
+                      <a:endParaRPr lang="en-CA"/>
+                    </a:p>
+                  </a:txBody>
+                  <a:tcPr/>
+                </a:tc>
+                <a:tc>
+                  <a:txBody>
+                    <a:bodyPr/>
+                    <a:lstStyle/>
+                    <a:p>
+                      <a:endParaRPr lang="en-CA" dirty="0"/>
+                    </a:p>
+                  </a:txBody>
+                  <a:tcPr/>
+                </a:tc>
+                <a:extLst>
+                  <a:ext uri="{0D108BD9-81ED-4DB2-BD59-A6C34878D82A}">
+                    <a16:rowId xmlns:a16="http://schemas.microsoft.com/office/drawing/2014/main" val="3256791078"/>
+                  </a:ext>
+                </a:extLst>
+              </a:tr>
+            </a:tbl>
+          </a:graphicData>
+        </a:graphic>
+      </p:graphicFrame>
+    </p:spTree>
+    <p:extLst>
+      <p:ext uri="{BB962C8B-B14F-4D97-AF65-F5344CB8AC3E}">
+        <p14:creationId xmlns:p14="http://schemas.microsoft.com/office/powerpoint/2010/main" val="2416238504"/>
+      </p:ext>
+    </p:extLst>
+  </p:cSld>
+  <p:clrMapOvr>
+    <a:masterClrMapping/>
+  </p:clrMapOvr>
+</p:sld>
+</file>
+
 <file path=ppt/theme/theme1.xml><?xml version="1.0" encoding="utf-8"?>
 <a:theme xmlns:a="http://schemas.openxmlformats.org/drawingml/2006/main" name="Office Theme">
   <a:themeElements>

</xml_diff>

<commit_message>
Added a speed lock button to the control diagram
#1
</commit_message>
<xml_diff>
--- a/images/Controller_layout.pptx
+++ b/images/Controller_layout.pptx
@@ -266,7 +266,7 @@
           <a:p>
             <a:fld id="{C4A6E63F-199A-4647-8B5F-D53BEDD4705B}" type="datetimeFigureOut">
               <a:rPr lang="en-CA" smtClean="0"/>
-              <a:t>2018-01-26</a:t>
+              <a:t>2018-01-29</a:t>
             </a:fld>
             <a:endParaRPr lang="en-CA"/>
           </a:p>
@@ -466,7 +466,7 @@
           <a:p>
             <a:fld id="{C4A6E63F-199A-4647-8B5F-D53BEDD4705B}" type="datetimeFigureOut">
               <a:rPr lang="en-CA" smtClean="0"/>
-              <a:t>2018-01-26</a:t>
+              <a:t>2018-01-29</a:t>
             </a:fld>
             <a:endParaRPr lang="en-CA"/>
           </a:p>
@@ -676,7 +676,7 @@
           <a:p>
             <a:fld id="{C4A6E63F-199A-4647-8B5F-D53BEDD4705B}" type="datetimeFigureOut">
               <a:rPr lang="en-CA" smtClean="0"/>
-              <a:t>2018-01-26</a:t>
+              <a:t>2018-01-29</a:t>
             </a:fld>
             <a:endParaRPr lang="en-CA"/>
           </a:p>
@@ -876,7 +876,7 @@
           <a:p>
             <a:fld id="{C4A6E63F-199A-4647-8B5F-D53BEDD4705B}" type="datetimeFigureOut">
               <a:rPr lang="en-CA" smtClean="0"/>
-              <a:t>2018-01-26</a:t>
+              <a:t>2018-01-29</a:t>
             </a:fld>
             <a:endParaRPr lang="en-CA"/>
           </a:p>
@@ -1152,7 +1152,7 @@
           <a:p>
             <a:fld id="{C4A6E63F-199A-4647-8B5F-D53BEDD4705B}" type="datetimeFigureOut">
               <a:rPr lang="en-CA" smtClean="0"/>
-              <a:t>2018-01-26</a:t>
+              <a:t>2018-01-29</a:t>
             </a:fld>
             <a:endParaRPr lang="en-CA"/>
           </a:p>
@@ -1420,7 +1420,7 @@
           <a:p>
             <a:fld id="{C4A6E63F-199A-4647-8B5F-D53BEDD4705B}" type="datetimeFigureOut">
               <a:rPr lang="en-CA" smtClean="0"/>
-              <a:t>2018-01-26</a:t>
+              <a:t>2018-01-29</a:t>
             </a:fld>
             <a:endParaRPr lang="en-CA"/>
           </a:p>
@@ -1835,7 +1835,7 @@
           <a:p>
             <a:fld id="{C4A6E63F-199A-4647-8B5F-D53BEDD4705B}" type="datetimeFigureOut">
               <a:rPr lang="en-CA" smtClean="0"/>
-              <a:t>2018-01-26</a:t>
+              <a:t>2018-01-29</a:t>
             </a:fld>
             <a:endParaRPr lang="en-CA"/>
           </a:p>
@@ -1977,7 +1977,7 @@
           <a:p>
             <a:fld id="{C4A6E63F-199A-4647-8B5F-D53BEDD4705B}" type="datetimeFigureOut">
               <a:rPr lang="en-CA" smtClean="0"/>
-              <a:t>2018-01-26</a:t>
+              <a:t>2018-01-29</a:t>
             </a:fld>
             <a:endParaRPr lang="en-CA"/>
           </a:p>
@@ -2090,7 +2090,7 @@
           <a:p>
             <a:fld id="{C4A6E63F-199A-4647-8B5F-D53BEDD4705B}" type="datetimeFigureOut">
               <a:rPr lang="en-CA" smtClean="0"/>
-              <a:t>2018-01-26</a:t>
+              <a:t>2018-01-29</a:t>
             </a:fld>
             <a:endParaRPr lang="en-CA"/>
           </a:p>
@@ -2403,7 +2403,7 @@
           <a:p>
             <a:fld id="{C4A6E63F-199A-4647-8B5F-D53BEDD4705B}" type="datetimeFigureOut">
               <a:rPr lang="en-CA" smtClean="0"/>
-              <a:t>2018-01-26</a:t>
+              <a:t>2018-01-29</a:t>
             </a:fld>
             <a:endParaRPr lang="en-CA"/>
           </a:p>
@@ -2692,7 +2692,7 @@
           <a:p>
             <a:fld id="{C4A6E63F-199A-4647-8B5F-D53BEDD4705B}" type="datetimeFigureOut">
               <a:rPr lang="en-CA" smtClean="0"/>
-              <a:t>2018-01-26</a:t>
+              <a:t>2018-01-29</a:t>
             </a:fld>
             <a:endParaRPr lang="en-CA"/>
           </a:p>
@@ -2935,7 +2935,7 @@
           <a:p>
             <a:fld id="{C4A6E63F-199A-4647-8B5F-D53BEDD4705B}" type="datetimeFigureOut">
               <a:rPr lang="en-CA" smtClean="0"/>
-              <a:t>2018-01-26</a:t>
+              <a:t>2018-01-29</a:t>
             </a:fld>
             <a:endParaRPr lang="en-CA"/>
           </a:p>
@@ -4608,6 +4608,140 @@
           <a:xfrm>
             <a:off x="3482422" y="3556000"/>
             <a:ext cx="1228986" cy="336550"/>
+          </a:xfrm>
+          <a:prstGeom prst="straightConnector1">
+            <a:avLst/>
+          </a:prstGeom>
+          <a:ln w="38100">
+            <a:solidFill>
+              <a:srgbClr val="00B0F0"/>
+            </a:solidFill>
+            <a:tailEnd type="triangle"/>
+          </a:ln>
+        </p:spPr>
+        <p:style>
+          <a:lnRef idx="1">
+            <a:schemeClr val="accent1"/>
+          </a:lnRef>
+          <a:fillRef idx="0">
+            <a:schemeClr val="accent1"/>
+          </a:fillRef>
+          <a:effectRef idx="0">
+            <a:schemeClr val="accent1"/>
+          </a:effectRef>
+          <a:fontRef idx="minor">
+            <a:schemeClr val="tx1"/>
+          </a:fontRef>
+        </p:style>
+      </p:cxnSp>
+      <p:sp>
+        <p:nvSpPr>
+          <p:cNvPr id="34" name="Rectangle 33">
+            <a:extLst>
+              <a:ext uri="{FF2B5EF4-FFF2-40B4-BE49-F238E27FC236}">
+                <a16:creationId xmlns:a16="http://schemas.microsoft.com/office/drawing/2014/main" id="{03CF63D3-8000-4B04-B59E-DCED4A93786D}"/>
+              </a:ext>
+            </a:extLst>
+          </p:cNvPr>
+          <p:cNvSpPr/>
+          <p:nvPr/>
+        </p:nvSpPr>
+        <p:spPr>
+          <a:xfrm>
+            <a:off x="1766873" y="4471388"/>
+            <a:ext cx="2093503" cy="591795"/>
+          </a:xfrm>
+          <a:prstGeom prst="rect">
+            <a:avLst/>
+          </a:prstGeom>
+          <a:solidFill>
+            <a:schemeClr val="bg1"/>
+          </a:solidFill>
+          <a:ln>
+            <a:solidFill>
+              <a:srgbClr val="00B0F0"/>
+            </a:solidFill>
+          </a:ln>
+        </p:spPr>
+        <p:style>
+          <a:lnRef idx="2">
+            <a:schemeClr val="accent2">
+              <a:shade val="50000"/>
+            </a:schemeClr>
+          </a:lnRef>
+          <a:fillRef idx="1">
+            <a:schemeClr val="accent2"/>
+          </a:fillRef>
+          <a:effectRef idx="0">
+            <a:schemeClr val="accent2"/>
+          </a:effectRef>
+          <a:fontRef idx="minor">
+            <a:schemeClr val="lt1"/>
+          </a:fontRef>
+        </p:style>
+        <p:txBody>
+          <a:bodyPr rtlCol="0" anchor="ctr"/>
+          <a:lstStyle/>
+          <a:p>
+            <a:pPr algn="ctr"/>
+            <a:endParaRPr lang="en-CA"/>
+          </a:p>
+        </p:txBody>
+      </p:sp>
+      <p:sp>
+        <p:nvSpPr>
+          <p:cNvPr id="43" name="TextBox 42">
+            <a:extLst>
+              <a:ext uri="{FF2B5EF4-FFF2-40B4-BE49-F238E27FC236}">
+                <a16:creationId xmlns:a16="http://schemas.microsoft.com/office/drawing/2014/main" id="{5E153BE5-DC61-460A-8E8D-29156DCC29FE}"/>
+              </a:ext>
+            </a:extLst>
+          </p:cNvPr>
+          <p:cNvSpPr txBox="1"/>
+          <p:nvPr/>
+        </p:nvSpPr>
+        <p:spPr>
+          <a:xfrm>
+            <a:off x="1763679" y="4554680"/>
+            <a:ext cx="2046687" cy="369332"/>
+          </a:xfrm>
+          <a:prstGeom prst="rect">
+            <a:avLst/>
+          </a:prstGeom>
+          <a:noFill/>
+        </p:spPr>
+        <p:txBody>
+          <a:bodyPr wrap="square" rtlCol="0">
+            <a:spAutoFit/>
+          </a:bodyPr>
+          <a:lstStyle/>
+          <a:p>
+            <a:r>
+              <a:rPr lang="en-CA" dirty="0"/>
+              <a:t>Lock/Unlock Speed</a:t>
+            </a:r>
+          </a:p>
+        </p:txBody>
+      </p:sp>
+      <p:cxnSp>
+        <p:nvCxnSpPr>
+          <p:cNvPr id="45" name="Straight Arrow Connector 44">
+            <a:extLst>
+              <a:ext uri="{FF2B5EF4-FFF2-40B4-BE49-F238E27FC236}">
+                <a16:creationId xmlns:a16="http://schemas.microsoft.com/office/drawing/2014/main" id="{66342DD3-8E57-43C3-AFCB-2BAA4A1E6044}"/>
+              </a:ext>
+            </a:extLst>
+          </p:cNvPr>
+          <p:cNvCxnSpPr>
+            <a:cxnSpLocks/>
+            <a:stCxn id="43" idx="3"/>
+          </p:cNvCxnSpPr>
+          <p:nvPr/>
+        </p:nvCxnSpPr>
+        <p:spPr>
+          <a:xfrm flipV="1">
+            <a:off x="3810366" y="3975842"/>
+            <a:ext cx="1303888" cy="763504"/>
           </a:xfrm>
           <a:prstGeom prst="straightConnector1">
             <a:avLst/>

</xml_diff>

<commit_message>
added more controls for preprogramed_points
</commit_message>
<xml_diff>
--- a/images/Controller_layout.pptx
+++ b/images/Controller_layout.pptx
@@ -6,7 +6,6 @@
   </p:sldMasterIdLst>
   <p:sldIdLst>
     <p:sldId id="257" r:id="rId2"/>
-    <p:sldId id="258" r:id="rId3"/>
   </p:sldIdLst>
   <p:sldSz cx="12192000" cy="6858000"/>
   <p:notesSz cx="6858000" cy="9144000"/>
@@ -113,10 +112,6 @@
 </p:presentation>
 </file>
 
-<file path=ppt/revisionInfo.xml><?xml version="1.0" encoding="utf-8"?>
-<p1510:revInfo xmlns:a="http://schemas.openxmlformats.org/drawingml/2006/main" xmlns:r="http://schemas.openxmlformats.org/officeDocument/2006/relationships" xmlns:p1510="http://schemas.microsoft.com/office/powerpoint/2015/10/main"/>
-</file>
-
 <file path=ppt/slideLayouts/slideLayout1.xml><?xml version="1.0" encoding="utf-8"?>
 <p:sldLayout xmlns:a="http://schemas.openxmlformats.org/drawingml/2006/main" xmlns:r="http://schemas.openxmlformats.org/officeDocument/2006/relationships" xmlns:p="http://schemas.openxmlformats.org/presentationml/2006/main" type="title" preserve="1">
   <p:cSld name="Title Slide">
@@ -266,7 +261,7 @@
           <a:p>
             <a:fld id="{C4A6E63F-199A-4647-8B5F-D53BEDD4705B}" type="datetimeFigureOut">
               <a:rPr lang="en-CA" smtClean="0"/>
-              <a:t>2018-01-29</a:t>
+              <a:t>2018-02-18</a:t>
             </a:fld>
             <a:endParaRPr lang="en-CA"/>
           </a:p>
@@ -466,7 +461,7 @@
           <a:p>
             <a:fld id="{C4A6E63F-199A-4647-8B5F-D53BEDD4705B}" type="datetimeFigureOut">
               <a:rPr lang="en-CA" smtClean="0"/>
-              <a:t>2018-01-29</a:t>
+              <a:t>2018-02-18</a:t>
             </a:fld>
             <a:endParaRPr lang="en-CA"/>
           </a:p>
@@ -676,7 +671,7 @@
           <a:p>
             <a:fld id="{C4A6E63F-199A-4647-8B5F-D53BEDD4705B}" type="datetimeFigureOut">
               <a:rPr lang="en-CA" smtClean="0"/>
-              <a:t>2018-01-29</a:t>
+              <a:t>2018-02-18</a:t>
             </a:fld>
             <a:endParaRPr lang="en-CA"/>
           </a:p>
@@ -876,7 +871,7 @@
           <a:p>
             <a:fld id="{C4A6E63F-199A-4647-8B5F-D53BEDD4705B}" type="datetimeFigureOut">
               <a:rPr lang="en-CA" smtClean="0"/>
-              <a:t>2018-01-29</a:t>
+              <a:t>2018-02-18</a:t>
             </a:fld>
             <a:endParaRPr lang="en-CA"/>
           </a:p>
@@ -1152,7 +1147,7 @@
           <a:p>
             <a:fld id="{C4A6E63F-199A-4647-8B5F-D53BEDD4705B}" type="datetimeFigureOut">
               <a:rPr lang="en-CA" smtClean="0"/>
-              <a:t>2018-01-29</a:t>
+              <a:t>2018-02-18</a:t>
             </a:fld>
             <a:endParaRPr lang="en-CA"/>
           </a:p>
@@ -1420,7 +1415,7 @@
           <a:p>
             <a:fld id="{C4A6E63F-199A-4647-8B5F-D53BEDD4705B}" type="datetimeFigureOut">
               <a:rPr lang="en-CA" smtClean="0"/>
-              <a:t>2018-01-29</a:t>
+              <a:t>2018-02-18</a:t>
             </a:fld>
             <a:endParaRPr lang="en-CA"/>
           </a:p>
@@ -1835,7 +1830,7 @@
           <a:p>
             <a:fld id="{C4A6E63F-199A-4647-8B5F-D53BEDD4705B}" type="datetimeFigureOut">
               <a:rPr lang="en-CA" smtClean="0"/>
-              <a:t>2018-01-29</a:t>
+              <a:t>2018-02-18</a:t>
             </a:fld>
             <a:endParaRPr lang="en-CA"/>
           </a:p>
@@ -1977,7 +1972,7 @@
           <a:p>
             <a:fld id="{C4A6E63F-199A-4647-8B5F-D53BEDD4705B}" type="datetimeFigureOut">
               <a:rPr lang="en-CA" smtClean="0"/>
-              <a:t>2018-01-29</a:t>
+              <a:t>2018-02-18</a:t>
             </a:fld>
             <a:endParaRPr lang="en-CA"/>
           </a:p>
@@ -2090,7 +2085,7 @@
           <a:p>
             <a:fld id="{C4A6E63F-199A-4647-8B5F-D53BEDD4705B}" type="datetimeFigureOut">
               <a:rPr lang="en-CA" smtClean="0"/>
-              <a:t>2018-01-29</a:t>
+              <a:t>2018-02-18</a:t>
             </a:fld>
             <a:endParaRPr lang="en-CA"/>
           </a:p>
@@ -2403,7 +2398,7 @@
           <a:p>
             <a:fld id="{C4A6E63F-199A-4647-8B5F-D53BEDD4705B}" type="datetimeFigureOut">
               <a:rPr lang="en-CA" smtClean="0"/>
-              <a:t>2018-01-29</a:t>
+              <a:t>2018-02-18</a:t>
             </a:fld>
             <a:endParaRPr lang="en-CA"/>
           </a:p>
@@ -2692,7 +2687,7 @@
           <a:p>
             <a:fld id="{C4A6E63F-199A-4647-8B5F-D53BEDD4705B}" type="datetimeFigureOut">
               <a:rPr lang="en-CA" smtClean="0"/>
-              <a:t>2018-01-29</a:t>
+              <a:t>2018-02-18</a:t>
             </a:fld>
             <a:endParaRPr lang="en-CA"/>
           </a:p>
@@ -2935,7 +2930,7 @@
           <a:p>
             <a:fld id="{C4A6E63F-199A-4647-8B5F-D53BEDD4705B}" type="datetimeFigureOut">
               <a:rPr lang="en-CA" smtClean="0"/>
-              <a:t>2018-01-29</a:t>
+              <a:t>2018-02-18</a:t>
             </a:fld>
             <a:endParaRPr lang="en-CA"/>
           </a:p>
@@ -3366,7 +3361,7 @@
         </p:nvSpPr>
         <p:spPr>
           <a:xfrm>
-            <a:off x="8355435" y="973123"/>
+            <a:off x="8331623" y="155727"/>
             <a:ext cx="1963023" cy="897622"/>
           </a:xfrm>
           <a:prstGeom prst="rect">
@@ -3456,7 +3451,7 @@
         </p:nvSpPr>
         <p:spPr>
           <a:xfrm>
-            <a:off x="8481270" y="1047750"/>
+            <a:off x="8457458" y="230354"/>
             <a:ext cx="369115" cy="739105"/>
           </a:xfrm>
           <a:prstGeom prst="upDownArrow">
@@ -3502,7 +3497,7 @@
         </p:nvSpPr>
         <p:spPr>
           <a:xfrm>
-            <a:off x="8850385" y="1232636"/>
+            <a:off x="8826573" y="415240"/>
             <a:ext cx="1468073" cy="369332"/>
           </a:xfrm>
           <a:prstGeom prst="rect">
@@ -3537,7 +3532,7 @@
         </p:nvSpPr>
         <p:spPr>
           <a:xfrm>
-            <a:off x="8355435" y="1971741"/>
+            <a:off x="8324042" y="3107189"/>
             <a:ext cx="1963023" cy="897622"/>
           </a:xfrm>
           <a:prstGeom prst="rect">
@@ -3587,7 +3582,7 @@
         </p:nvSpPr>
         <p:spPr>
           <a:xfrm>
-            <a:off x="8481270" y="2046368"/>
+            <a:off x="8449877" y="3181816"/>
             <a:ext cx="369115" cy="739105"/>
           </a:xfrm>
           <a:prstGeom prst="upDownArrow">
@@ -3633,7 +3628,7 @@
         </p:nvSpPr>
         <p:spPr>
           <a:xfrm>
-            <a:off x="8850385" y="2231254"/>
+            <a:off x="8818992" y="3366702"/>
             <a:ext cx="1468073" cy="369332"/>
           </a:xfrm>
           <a:prstGeom prst="rect">
@@ -3668,7 +3663,7 @@
         </p:nvSpPr>
         <p:spPr>
           <a:xfrm>
-            <a:off x="8355435" y="3058116"/>
+            <a:off x="8324042" y="4193564"/>
             <a:ext cx="1963023" cy="897622"/>
           </a:xfrm>
           <a:prstGeom prst="rect">
@@ -3718,7 +3713,7 @@
         </p:nvSpPr>
         <p:spPr>
           <a:xfrm>
-            <a:off x="8850385" y="3317629"/>
+            <a:off x="8818992" y="4453077"/>
             <a:ext cx="1468073" cy="369332"/>
           </a:xfrm>
           <a:prstGeom prst="rect">
@@ -3753,7 +3748,7 @@
         </p:nvSpPr>
         <p:spPr>
           <a:xfrm>
-            <a:off x="8481270" y="3173793"/>
+            <a:off x="8449877" y="4309241"/>
             <a:ext cx="369115" cy="255207"/>
           </a:xfrm>
           <a:prstGeom prst="curvedDownArrow">
@@ -3803,7 +3798,7 @@
         </p:nvSpPr>
         <p:spPr>
           <a:xfrm rot="10800000">
-            <a:off x="8459838" y="3502295"/>
+            <a:off x="8428445" y="4637743"/>
             <a:ext cx="369115" cy="255207"/>
           </a:xfrm>
           <a:prstGeom prst="curvedDownArrow">
@@ -3849,14 +3844,15 @@
             </a:extLst>
           </p:cNvPr>
           <p:cNvCxnSpPr>
+            <a:cxnSpLocks/>
             <a:stCxn id="8" idx="1"/>
           </p:cNvCxnSpPr>
           <p:nvPr/>
         </p:nvCxnSpPr>
         <p:spPr>
           <a:xfrm flipH="1">
-            <a:off x="6305550" y="1421934"/>
-            <a:ext cx="2049885" cy="624434"/>
+            <a:off x="6124101" y="604538"/>
+            <a:ext cx="2207522" cy="1640961"/>
           </a:xfrm>
           <a:prstGeom prst="straightConnector1">
             <a:avLst/>
@@ -3890,14 +3886,15 @@
             </a:extLst>
           </p:cNvPr>
           <p:cNvCxnSpPr>
+            <a:cxnSpLocks/>
             <a:stCxn id="9" idx="1"/>
           </p:cNvCxnSpPr>
           <p:nvPr/>
         </p:nvCxnSpPr>
         <p:spPr>
           <a:xfrm flipH="1">
-            <a:off x="6369050" y="2420552"/>
-            <a:ext cx="1986385" cy="1209346"/>
+            <a:off x="6179481" y="3556000"/>
+            <a:ext cx="2144561" cy="336550"/>
           </a:xfrm>
           <a:prstGeom prst="straightConnector1">
             <a:avLst/>
@@ -3931,14 +3928,15 @@
             </a:extLst>
           </p:cNvPr>
           <p:cNvCxnSpPr>
+            <a:cxnSpLocks/>
             <a:stCxn id="12" idx="1"/>
           </p:cNvCxnSpPr>
           <p:nvPr/>
         </p:nvCxnSpPr>
         <p:spPr>
-          <a:xfrm flipH="1">
-            <a:off x="6369050" y="3506927"/>
-            <a:ext cx="1986385" cy="122971"/>
+          <a:xfrm flipH="1" flipV="1">
+            <a:off x="6179481" y="3920921"/>
+            <a:ext cx="2144561" cy="721454"/>
           </a:xfrm>
           <a:prstGeom prst="straightConnector1">
             <a:avLst/>
@@ -3976,7 +3974,7 @@
         </p:nvSpPr>
         <p:spPr>
           <a:xfrm>
-            <a:off x="8355435" y="4139772"/>
+            <a:off x="8324042" y="5275220"/>
             <a:ext cx="1963023" cy="897622"/>
           </a:xfrm>
           <a:prstGeom prst="rect">
@@ -4026,7 +4024,7 @@
         </p:nvSpPr>
         <p:spPr>
           <a:xfrm>
-            <a:off x="8481270" y="4214399"/>
+            <a:off x="8449877" y="5349847"/>
             <a:ext cx="369115" cy="739105"/>
           </a:xfrm>
           <a:prstGeom prst="upDownArrow">
@@ -4072,7 +4070,7 @@
         </p:nvSpPr>
         <p:spPr>
           <a:xfrm>
-            <a:off x="8850385" y="4399285"/>
+            <a:off x="8818992" y="5534733"/>
             <a:ext cx="1468073" cy="369332"/>
           </a:xfrm>
           <a:prstGeom prst="rect">
@@ -4103,14 +4101,15 @@
             </a:extLst>
           </p:cNvPr>
           <p:cNvCxnSpPr>
+            <a:cxnSpLocks/>
             <a:stCxn id="23" idx="1"/>
           </p:cNvCxnSpPr>
           <p:nvPr/>
         </p:nvCxnSpPr>
         <p:spPr>
-          <a:xfrm flipH="1">
-            <a:off x="6096000" y="4588583"/>
-            <a:ext cx="2259435" cy="510467"/>
+          <a:xfrm flipH="1" flipV="1">
+            <a:off x="5814060" y="5214157"/>
+            <a:ext cx="2509982" cy="509874"/>
           </a:xfrm>
           <a:prstGeom prst="straightConnector1">
             <a:avLst/>
@@ -4742,6 +4741,220 @@
           <a:xfrm flipV="1">
             <a:off x="3810366" y="3975842"/>
             <a:ext cx="1303888" cy="763504"/>
+          </a:xfrm>
+          <a:prstGeom prst="straightConnector1">
+            <a:avLst/>
+          </a:prstGeom>
+          <a:ln w="38100">
+            <a:solidFill>
+              <a:srgbClr val="00B0F0"/>
+            </a:solidFill>
+            <a:tailEnd type="triangle"/>
+          </a:ln>
+        </p:spPr>
+        <p:style>
+          <a:lnRef idx="1">
+            <a:schemeClr val="accent1"/>
+          </a:lnRef>
+          <a:fillRef idx="0">
+            <a:schemeClr val="accent1"/>
+          </a:fillRef>
+          <a:effectRef idx="0">
+            <a:schemeClr val="accent1"/>
+          </a:effectRef>
+          <a:fontRef idx="minor">
+            <a:schemeClr val="tx1"/>
+          </a:fontRef>
+        </p:style>
+      </p:cxnSp>
+      <p:sp>
+        <p:nvSpPr>
+          <p:cNvPr id="58" name="Rectangle 57">
+            <a:extLst>
+              <a:ext uri="{FF2B5EF4-FFF2-40B4-BE49-F238E27FC236}">
+                <a16:creationId xmlns:a16="http://schemas.microsoft.com/office/drawing/2014/main" id="{A703FE5B-8973-4CBB-93FD-5F48AABCEA67}"/>
+              </a:ext>
+            </a:extLst>
+          </p:cNvPr>
+          <p:cNvSpPr/>
+          <p:nvPr/>
+        </p:nvSpPr>
+        <p:spPr>
+          <a:xfrm>
+            <a:off x="8324042" y="1247311"/>
+            <a:ext cx="1963023" cy="967906"/>
+          </a:xfrm>
+          <a:prstGeom prst="rect">
+            <a:avLst/>
+          </a:prstGeom>
+          <a:solidFill>
+            <a:schemeClr val="bg1"/>
+          </a:solidFill>
+          <a:ln>
+            <a:solidFill>
+              <a:srgbClr val="00B0F0"/>
+            </a:solidFill>
+          </a:ln>
+        </p:spPr>
+        <p:style>
+          <a:lnRef idx="2">
+            <a:schemeClr val="accent2">
+              <a:shade val="50000"/>
+            </a:schemeClr>
+          </a:lnRef>
+          <a:fillRef idx="1">
+            <a:schemeClr val="accent2"/>
+          </a:fillRef>
+          <a:effectRef idx="0">
+            <a:schemeClr val="accent2"/>
+          </a:effectRef>
+          <a:fontRef idx="minor">
+            <a:schemeClr val="lt1"/>
+          </a:fontRef>
+        </p:style>
+        <p:txBody>
+          <a:bodyPr rtlCol="0" anchor="ctr"/>
+          <a:lstStyle/>
+          <a:p>
+            <a:pPr algn="ctr"/>
+            <a:endParaRPr lang="en-CA"/>
+          </a:p>
+        </p:txBody>
+      </p:sp>
+      <p:sp>
+        <p:nvSpPr>
+          <p:cNvPr id="59" name="TextBox 58">
+            <a:extLst>
+              <a:ext uri="{FF2B5EF4-FFF2-40B4-BE49-F238E27FC236}">
+                <a16:creationId xmlns:a16="http://schemas.microsoft.com/office/drawing/2014/main" id="{54E519B1-1CA9-4949-A1C1-D02071CEC0F9}"/>
+              </a:ext>
+            </a:extLst>
+          </p:cNvPr>
+          <p:cNvSpPr txBox="1"/>
+          <p:nvPr/>
+        </p:nvSpPr>
+        <p:spPr>
+          <a:xfrm>
+            <a:off x="8456078" y="1689163"/>
+            <a:ext cx="1617720" cy="369332"/>
+          </a:xfrm>
+          <a:prstGeom prst="rect">
+            <a:avLst/>
+          </a:prstGeom>
+          <a:noFill/>
+        </p:spPr>
+        <p:txBody>
+          <a:bodyPr wrap="square" rtlCol="0">
+            <a:spAutoFit/>
+          </a:bodyPr>
+          <a:lstStyle/>
+          <a:p>
+            <a:r>
+              <a:rPr lang="en-CA" dirty="0"/>
+              <a:t>Previous Point</a:t>
+            </a:r>
+          </a:p>
+        </p:txBody>
+      </p:sp>
+      <p:sp>
+        <p:nvSpPr>
+          <p:cNvPr id="61" name="TextBox 60">
+            <a:extLst>
+              <a:ext uri="{FF2B5EF4-FFF2-40B4-BE49-F238E27FC236}">
+                <a16:creationId xmlns:a16="http://schemas.microsoft.com/office/drawing/2014/main" id="{404FB8EE-ED0A-4B7E-8956-84660407AE58}"/>
+              </a:ext>
+            </a:extLst>
+          </p:cNvPr>
+          <p:cNvSpPr txBox="1"/>
+          <p:nvPr/>
+        </p:nvSpPr>
+        <p:spPr>
+          <a:xfrm>
+            <a:off x="8496694" y="1330603"/>
+            <a:ext cx="1617720" cy="369332"/>
+          </a:xfrm>
+          <a:prstGeom prst="rect">
+            <a:avLst/>
+          </a:prstGeom>
+          <a:noFill/>
+        </p:spPr>
+        <p:txBody>
+          <a:bodyPr wrap="square" rtlCol="0">
+            <a:spAutoFit/>
+          </a:bodyPr>
+          <a:lstStyle/>
+          <a:p>
+            <a:r>
+              <a:rPr lang="en-CA" dirty="0"/>
+              <a:t>Next Point</a:t>
+            </a:r>
+          </a:p>
+        </p:txBody>
+      </p:sp>
+      <p:cxnSp>
+        <p:nvCxnSpPr>
+          <p:cNvPr id="62" name="Straight Arrow Connector 61">
+            <a:extLst>
+              <a:ext uri="{FF2B5EF4-FFF2-40B4-BE49-F238E27FC236}">
+                <a16:creationId xmlns:a16="http://schemas.microsoft.com/office/drawing/2014/main" id="{D4E4EF54-9224-4430-BFDA-A502E2929A30}"/>
+              </a:ext>
+            </a:extLst>
+          </p:cNvPr>
+          <p:cNvCxnSpPr>
+            <a:cxnSpLocks/>
+            <a:stCxn id="61" idx="1"/>
+          </p:cNvCxnSpPr>
+          <p:nvPr/>
+        </p:nvCxnSpPr>
+        <p:spPr>
+          <a:xfrm flipH="1">
+            <a:off x="5949235" y="1515269"/>
+            <a:ext cx="2547459" cy="1099512"/>
+          </a:xfrm>
+          <a:prstGeom prst="straightConnector1">
+            <a:avLst/>
+          </a:prstGeom>
+          <a:ln w="38100">
+            <a:solidFill>
+              <a:srgbClr val="00B0F0"/>
+            </a:solidFill>
+            <a:tailEnd type="triangle"/>
+          </a:ln>
+        </p:spPr>
+        <p:style>
+          <a:lnRef idx="1">
+            <a:schemeClr val="accent1"/>
+          </a:lnRef>
+          <a:fillRef idx="0">
+            <a:schemeClr val="accent1"/>
+          </a:fillRef>
+          <a:effectRef idx="0">
+            <a:schemeClr val="accent1"/>
+          </a:effectRef>
+          <a:fontRef idx="minor">
+            <a:schemeClr val="tx1"/>
+          </a:fontRef>
+        </p:style>
+      </p:cxnSp>
+      <p:cxnSp>
+        <p:nvCxnSpPr>
+          <p:cNvPr id="63" name="Straight Arrow Connector 62">
+            <a:extLst>
+              <a:ext uri="{FF2B5EF4-FFF2-40B4-BE49-F238E27FC236}">
+                <a16:creationId xmlns:a16="http://schemas.microsoft.com/office/drawing/2014/main" id="{FE1A037D-1E28-46A0-AF2B-15E673CAB52F}"/>
+              </a:ext>
+            </a:extLst>
+          </p:cNvPr>
+          <p:cNvCxnSpPr>
+            <a:cxnSpLocks/>
+            <a:stCxn id="59" idx="1"/>
+          </p:cNvCxnSpPr>
+          <p:nvPr/>
+        </p:nvCxnSpPr>
+        <p:spPr>
+          <a:xfrm flipH="1">
+            <a:off x="6332220" y="1873829"/>
+            <a:ext cx="2123858" cy="699589"/>
           </a:xfrm>
           <a:prstGeom prst="straightConnector1">
             <a:avLst/>
@@ -4772,820 +4985,6 @@
     <p:extLst>
       <p:ext uri="{BB962C8B-B14F-4D97-AF65-F5344CB8AC3E}">
         <p14:creationId xmlns:p14="http://schemas.microsoft.com/office/powerpoint/2010/main" val="3858047393"/>
-      </p:ext>
-    </p:extLst>
-  </p:cSld>
-  <p:clrMapOvr>
-    <a:masterClrMapping/>
-  </p:clrMapOvr>
-</p:sld>
-</file>
-
-<file path=ppt/slides/slide2.xml><?xml version="1.0" encoding="utf-8"?>
-<p:sld xmlns:a="http://schemas.openxmlformats.org/drawingml/2006/main" xmlns:r="http://schemas.openxmlformats.org/officeDocument/2006/relationships" xmlns:p="http://schemas.openxmlformats.org/presentationml/2006/main">
-  <p:cSld>
-    <p:spTree>
-      <p:nvGrpSpPr>
-        <p:cNvPr id="1" name=""/>
-        <p:cNvGrpSpPr/>
-        <p:nvPr/>
-      </p:nvGrpSpPr>
-      <p:grpSpPr>
-        <a:xfrm>
-          <a:off x="0" y="0"/>
-          <a:ext cx="0" cy="0"/>
-          <a:chOff x="0" y="0"/>
-          <a:chExt cx="0" cy="0"/>
-        </a:xfrm>
-      </p:grpSpPr>
-      <p:sp>
-        <p:nvSpPr>
-          <p:cNvPr id="2" name="Title 1">
-            <a:extLst>
-              <a:ext uri="{FF2B5EF4-FFF2-40B4-BE49-F238E27FC236}">
-                <a16:creationId xmlns:a16="http://schemas.microsoft.com/office/drawing/2014/main" id="{8A1C093C-0736-4DAA-8974-66BCD9799CA5}"/>
-              </a:ext>
-            </a:extLst>
-          </p:cNvPr>
-          <p:cNvSpPr>
-            <a:spLocks noGrp="1"/>
-          </p:cNvSpPr>
-          <p:nvPr>
-            <p:ph type="title"/>
-          </p:nvPr>
-        </p:nvSpPr>
-        <p:spPr/>
-        <p:txBody>
-          <a:bodyPr/>
-          <a:lstStyle/>
-          <a:p>
-            <a:r>
-              <a:rPr lang="en-CA" dirty="0"/>
-              <a:t>Commands sending to the Arduino</a:t>
-            </a:r>
-          </a:p>
-        </p:txBody>
-      </p:sp>
-      <p:graphicFrame>
-        <p:nvGraphicFramePr>
-          <p:cNvPr id="4" name="Content Placeholder 3">
-            <a:extLst>
-              <a:ext uri="{FF2B5EF4-FFF2-40B4-BE49-F238E27FC236}">
-                <a16:creationId xmlns:a16="http://schemas.microsoft.com/office/drawing/2014/main" id="{B2FCC273-E2C3-471E-A04F-664094411502}"/>
-              </a:ext>
-            </a:extLst>
-          </p:cNvPr>
-          <p:cNvGraphicFramePr>
-            <a:graphicFrameLocks noGrp="1"/>
-          </p:cNvGraphicFramePr>
-          <p:nvPr>
-            <p:ph idx="1"/>
-            <p:extLst>
-              <p:ext uri="{D42A27DB-BD31-4B8C-83A1-F6EECF244321}">
-                <p14:modId xmlns:p14="http://schemas.microsoft.com/office/powerpoint/2010/main" val="743732604"/>
-              </p:ext>
-            </p:extLst>
-          </p:nvPr>
-        </p:nvGraphicFramePr>
-        <p:xfrm>
-          <a:off x="838200" y="1825625"/>
-          <a:ext cx="10515600" cy="3708400"/>
-        </p:xfrm>
-        <a:graphic>
-          <a:graphicData uri="http://schemas.openxmlformats.org/drawingml/2006/table">
-            <a:tbl>
-              <a:tblPr firstRow="1" bandRow="1">
-                <a:tableStyleId>{5C22544A-7EE6-4342-B048-85BDC9FD1C3A}</a:tableStyleId>
-              </a:tblPr>
-              <a:tblGrid>
-                <a:gridCol w="2103120">
-                  <a:extLst>
-                    <a:ext uri="{9D8B030D-6E8A-4147-A177-3AD203B41FA5}">
-                      <a16:colId xmlns:a16="http://schemas.microsoft.com/office/drawing/2014/main" val="3769223371"/>
-                    </a:ext>
-                  </a:extLst>
-                </a:gridCol>
-                <a:gridCol w="2103120">
-                  <a:extLst>
-                    <a:ext uri="{9D8B030D-6E8A-4147-A177-3AD203B41FA5}">
-                      <a16:colId xmlns:a16="http://schemas.microsoft.com/office/drawing/2014/main" val="3908358758"/>
-                    </a:ext>
-                  </a:extLst>
-                </a:gridCol>
-                <a:gridCol w="2103120">
-                  <a:extLst>
-                    <a:ext uri="{9D8B030D-6E8A-4147-A177-3AD203B41FA5}">
-                      <a16:colId xmlns:a16="http://schemas.microsoft.com/office/drawing/2014/main" val="2172164165"/>
-                    </a:ext>
-                  </a:extLst>
-                </a:gridCol>
-                <a:gridCol w="2103120">
-                  <a:extLst>
-                    <a:ext uri="{9D8B030D-6E8A-4147-A177-3AD203B41FA5}">
-                      <a16:colId xmlns:a16="http://schemas.microsoft.com/office/drawing/2014/main" val="4170774790"/>
-                    </a:ext>
-                  </a:extLst>
-                </a:gridCol>
-                <a:gridCol w="2103120">
-                  <a:extLst>
-                    <a:ext uri="{9D8B030D-6E8A-4147-A177-3AD203B41FA5}">
-                      <a16:colId xmlns:a16="http://schemas.microsoft.com/office/drawing/2014/main" val="1129860999"/>
-                    </a:ext>
-                  </a:extLst>
-                </a:gridCol>
-              </a:tblGrid>
-              <a:tr h="370840">
-                <a:tc>
-                  <a:txBody>
-                    <a:bodyPr/>
-                    <a:lstStyle/>
-                    <a:p>
-                      <a:r>
-                        <a:rPr lang="en-CA" dirty="0"/>
-                        <a:t>Description</a:t>
-                      </a:r>
-                    </a:p>
-                  </a:txBody>
-                  <a:tcPr/>
-                </a:tc>
-                <a:tc>
-                  <a:txBody>
-                    <a:bodyPr/>
-                    <a:lstStyle/>
-                    <a:p>
-                      <a:r>
-                        <a:rPr lang="en-CA" dirty="0"/>
-                        <a:t>Mode</a:t>
-                      </a:r>
-                    </a:p>
-                  </a:txBody>
-                  <a:tcPr/>
-                </a:tc>
-                <a:tc>
-                  <a:txBody>
-                    <a:bodyPr/>
-                    <a:lstStyle/>
-                    <a:p>
-                      <a:r>
-                        <a:rPr lang="en-CA" dirty="0"/>
-                        <a:t>Value -</a:t>
-                      </a:r>
-                    </a:p>
-                  </a:txBody>
-                  <a:tcPr/>
-                </a:tc>
-                <a:tc>
-                  <a:txBody>
-                    <a:bodyPr/>
-                    <a:lstStyle/>
-                    <a:p>
-                      <a:r>
-                        <a:rPr lang="en-CA" dirty="0"/>
-                        <a:t>Value +</a:t>
-                      </a:r>
-                    </a:p>
-                  </a:txBody>
-                  <a:tcPr/>
-                </a:tc>
-                <a:tc>
-                  <a:txBody>
-                    <a:bodyPr/>
-                    <a:lstStyle/>
-                    <a:p>
-                      <a:r>
-                        <a:rPr lang="en-CA" dirty="0"/>
-                        <a:t>Note</a:t>
-                      </a:r>
-                    </a:p>
-                  </a:txBody>
-                  <a:tcPr/>
-                </a:tc>
-                <a:extLst>
-                  <a:ext uri="{0D108BD9-81ED-4DB2-BD59-A6C34878D82A}">
-                    <a16:rowId xmlns:a16="http://schemas.microsoft.com/office/drawing/2014/main" val="1604317501"/>
-                  </a:ext>
-                </a:extLst>
-              </a:tr>
-              <a:tr h="370840">
-                <a:tc>
-                  <a:txBody>
-                    <a:bodyPr/>
-                    <a:lstStyle/>
-                    <a:p>
-                      <a:r>
-                        <a:rPr lang="en-CA" dirty="0"/>
-                        <a:t>Rotate Velocity</a:t>
-                      </a:r>
-                    </a:p>
-                  </a:txBody>
-                  <a:tcPr/>
-                </a:tc>
-                <a:tc>
-                  <a:txBody>
-                    <a:bodyPr/>
-                    <a:lstStyle/>
-                    <a:p>
-                      <a:r>
-                        <a:rPr lang="en-CA" dirty="0"/>
-                        <a:t>0</a:t>
-                      </a:r>
-                    </a:p>
-                  </a:txBody>
-                  <a:tcPr/>
-                </a:tc>
-                <a:tc>
-                  <a:txBody>
-                    <a:bodyPr/>
-                    <a:lstStyle/>
-                    <a:p>
-                      <a:r>
-                        <a:rPr lang="en-CA" dirty="0"/>
-                        <a:t>Rotate -</a:t>
-                      </a:r>
-                    </a:p>
-                  </a:txBody>
-                  <a:tcPr/>
-                </a:tc>
-                <a:tc>
-                  <a:txBody>
-                    <a:bodyPr/>
-                    <a:lstStyle/>
-                    <a:p>
-                      <a:r>
-                        <a:rPr lang="en-CA" dirty="0"/>
-                        <a:t>Rotate+</a:t>
-                      </a:r>
-                    </a:p>
-                  </a:txBody>
-                  <a:tcPr/>
-                </a:tc>
-                <a:tc>
-                  <a:txBody>
-                    <a:bodyPr/>
-                    <a:lstStyle/>
-                    <a:p>
-                      <a:endParaRPr lang="en-CA"/>
-                    </a:p>
-                  </a:txBody>
-                  <a:tcPr/>
-                </a:tc>
-                <a:extLst>
-                  <a:ext uri="{0D108BD9-81ED-4DB2-BD59-A6C34878D82A}">
-                    <a16:rowId xmlns:a16="http://schemas.microsoft.com/office/drawing/2014/main" val="2183484033"/>
-                  </a:ext>
-                </a:extLst>
-              </a:tr>
-              <a:tr h="370840">
-                <a:tc>
-                  <a:txBody>
-                    <a:bodyPr/>
-                    <a:lstStyle/>
-                    <a:p>
-                      <a:r>
-                        <a:rPr lang="en-CA" dirty="0"/>
-                        <a:t>Lower Velocity</a:t>
-                      </a:r>
-                    </a:p>
-                  </a:txBody>
-                  <a:tcPr/>
-                </a:tc>
-                <a:tc>
-                  <a:txBody>
-                    <a:bodyPr/>
-                    <a:lstStyle/>
-                    <a:p>
-                      <a:r>
-                        <a:rPr lang="en-CA" dirty="0"/>
-                        <a:t>1</a:t>
-                      </a:r>
-                    </a:p>
-                  </a:txBody>
-                  <a:tcPr/>
-                </a:tc>
-                <a:tc>
-                  <a:txBody>
-                    <a:bodyPr/>
-                    <a:lstStyle/>
-                    <a:p>
-                      <a:r>
-                        <a:rPr lang="en-CA" dirty="0"/>
-                        <a:t>Lower -</a:t>
-                      </a:r>
-                    </a:p>
-                  </a:txBody>
-                  <a:tcPr/>
-                </a:tc>
-                <a:tc>
-                  <a:txBody>
-                    <a:bodyPr/>
-                    <a:lstStyle/>
-                    <a:p>
-                      <a:r>
-                        <a:rPr lang="en-CA" dirty="0"/>
-                        <a:t>Lower +</a:t>
-                      </a:r>
-                    </a:p>
-                  </a:txBody>
-                  <a:tcPr/>
-                </a:tc>
-                <a:tc>
-                  <a:txBody>
-                    <a:bodyPr/>
-                    <a:lstStyle/>
-                    <a:p>
-                      <a:endParaRPr lang="en-CA"/>
-                    </a:p>
-                  </a:txBody>
-                  <a:tcPr/>
-                </a:tc>
-                <a:extLst>
-                  <a:ext uri="{0D108BD9-81ED-4DB2-BD59-A6C34878D82A}">
-                    <a16:rowId xmlns:a16="http://schemas.microsoft.com/office/drawing/2014/main" val="1635579836"/>
-                  </a:ext>
-                </a:extLst>
-              </a:tr>
-              <a:tr h="370840">
-                <a:tc>
-                  <a:txBody>
-                    <a:bodyPr/>
-                    <a:lstStyle/>
-                    <a:p>
-                      <a:r>
-                        <a:rPr lang="en-CA" dirty="0"/>
-                        <a:t>Upper Velocity</a:t>
-                      </a:r>
-                    </a:p>
-                  </a:txBody>
-                  <a:tcPr/>
-                </a:tc>
-                <a:tc>
-                  <a:txBody>
-                    <a:bodyPr/>
-                    <a:lstStyle/>
-                    <a:p>
-                      <a:r>
-                        <a:rPr lang="en-CA" dirty="0"/>
-                        <a:t>2</a:t>
-                      </a:r>
-                    </a:p>
-                  </a:txBody>
-                  <a:tcPr/>
-                </a:tc>
-                <a:tc>
-                  <a:txBody>
-                    <a:bodyPr/>
-                    <a:lstStyle/>
-                    <a:p>
-                      <a:r>
-                        <a:rPr lang="en-CA" dirty="0"/>
-                        <a:t>Upper -</a:t>
-                      </a:r>
-                    </a:p>
-                  </a:txBody>
-                  <a:tcPr/>
-                </a:tc>
-                <a:tc>
-                  <a:txBody>
-                    <a:bodyPr/>
-                    <a:lstStyle/>
-                    <a:p>
-                      <a:r>
-                        <a:rPr lang="en-CA" dirty="0"/>
-                        <a:t>Upper +</a:t>
-                      </a:r>
-                    </a:p>
-                  </a:txBody>
-                  <a:tcPr/>
-                </a:tc>
-                <a:tc>
-                  <a:txBody>
-                    <a:bodyPr/>
-                    <a:lstStyle/>
-                    <a:p>
-                      <a:endParaRPr lang="en-CA"/>
-                    </a:p>
-                  </a:txBody>
-                  <a:tcPr/>
-                </a:tc>
-                <a:extLst>
-                  <a:ext uri="{0D108BD9-81ED-4DB2-BD59-A6C34878D82A}">
-                    <a16:rowId xmlns:a16="http://schemas.microsoft.com/office/drawing/2014/main" val="725317762"/>
-                  </a:ext>
-                </a:extLst>
-              </a:tr>
-              <a:tr h="370840">
-                <a:tc>
-                  <a:txBody>
-                    <a:bodyPr/>
-                    <a:lstStyle/>
-                    <a:p>
-                      <a:r>
-                        <a:rPr lang="en-CA" dirty="0"/>
-                        <a:t>Gripper Velocity</a:t>
-                      </a:r>
-                    </a:p>
-                  </a:txBody>
-                  <a:tcPr/>
-                </a:tc>
-                <a:tc>
-                  <a:txBody>
-                    <a:bodyPr/>
-                    <a:lstStyle/>
-                    <a:p>
-                      <a:r>
-                        <a:rPr lang="en-CA" dirty="0"/>
-                        <a:t>3</a:t>
-                      </a:r>
-                    </a:p>
-                  </a:txBody>
-                  <a:tcPr/>
-                </a:tc>
-                <a:tc>
-                  <a:txBody>
-                    <a:bodyPr/>
-                    <a:lstStyle/>
-                    <a:p>
-                      <a:r>
-                        <a:rPr lang="en-CA" dirty="0"/>
-                        <a:t>Gripper -</a:t>
-                      </a:r>
-                    </a:p>
-                  </a:txBody>
-                  <a:tcPr/>
-                </a:tc>
-                <a:tc>
-                  <a:txBody>
-                    <a:bodyPr/>
-                    <a:lstStyle/>
-                    <a:p>
-                      <a:r>
-                        <a:rPr lang="en-CA" dirty="0"/>
-                        <a:t>Gripper +</a:t>
-                      </a:r>
-                    </a:p>
-                  </a:txBody>
-                  <a:tcPr/>
-                </a:tc>
-                <a:tc>
-                  <a:txBody>
-                    <a:bodyPr/>
-                    <a:lstStyle/>
-                    <a:p>
-                      <a:endParaRPr lang="en-CA"/>
-                    </a:p>
-                  </a:txBody>
-                  <a:tcPr/>
-                </a:tc>
-                <a:extLst>
-                  <a:ext uri="{0D108BD9-81ED-4DB2-BD59-A6C34878D82A}">
-                    <a16:rowId xmlns:a16="http://schemas.microsoft.com/office/drawing/2014/main" val="2116403849"/>
-                  </a:ext>
-                </a:extLst>
-              </a:tr>
-              <a:tr h="370840">
-                <a:tc>
-                  <a:txBody>
-                    <a:bodyPr/>
-                    <a:lstStyle/>
-                    <a:p>
-                      <a:r>
-                        <a:rPr lang="en-CA" dirty="0"/>
-                        <a:t>Rotate Position</a:t>
-                      </a:r>
-                    </a:p>
-                  </a:txBody>
-                  <a:tcPr/>
-                </a:tc>
-                <a:tc>
-                  <a:txBody>
-                    <a:bodyPr/>
-                    <a:lstStyle/>
-                    <a:p>
-                      <a:r>
-                        <a:rPr lang="en-CA" dirty="0"/>
-                        <a:t>4</a:t>
-                      </a:r>
-                    </a:p>
-                  </a:txBody>
-                  <a:tcPr/>
-                </a:tc>
-                <a:tc>
-                  <a:txBody>
-                    <a:bodyPr/>
-                    <a:lstStyle/>
-                    <a:p>
-                      <a:r>
-                        <a:rPr lang="en-CA" dirty="0" err="1"/>
-                        <a:t>Angle_H</a:t>
-                      </a:r>
-                      <a:endParaRPr lang="en-CA" dirty="0"/>
-                    </a:p>
-                  </a:txBody>
-                  <a:tcPr/>
-                </a:tc>
-                <a:tc>
-                  <a:txBody>
-                    <a:bodyPr/>
-                    <a:lstStyle/>
-                    <a:p>
-                      <a:r>
-                        <a:rPr lang="en-CA" dirty="0" err="1"/>
-                        <a:t>Angle_L</a:t>
-                      </a:r>
-                      <a:endParaRPr lang="en-CA" dirty="0"/>
-                    </a:p>
-                  </a:txBody>
-                  <a:tcPr/>
-                </a:tc>
-                <a:tc>
-                  <a:txBody>
-                    <a:bodyPr/>
-                    <a:lstStyle/>
-                    <a:p>
-                      <a:r>
-                        <a:rPr lang="en-CA" dirty="0"/>
-                        <a:t>Angle(0,65536)</a:t>
-                      </a:r>
-                    </a:p>
-                  </a:txBody>
-                  <a:tcPr/>
-                </a:tc>
-                <a:extLst>
-                  <a:ext uri="{0D108BD9-81ED-4DB2-BD59-A6C34878D82A}">
-                    <a16:rowId xmlns:a16="http://schemas.microsoft.com/office/drawing/2014/main" val="2743854425"/>
-                  </a:ext>
-                </a:extLst>
-              </a:tr>
-              <a:tr h="370840">
-                <a:tc>
-                  <a:txBody>
-                    <a:bodyPr/>
-                    <a:lstStyle/>
-                    <a:p>
-                      <a:r>
-                        <a:rPr lang="en-CA" dirty="0"/>
-                        <a:t>Lower Position</a:t>
-                      </a:r>
-                    </a:p>
-                  </a:txBody>
-                  <a:tcPr/>
-                </a:tc>
-                <a:tc>
-                  <a:txBody>
-                    <a:bodyPr/>
-                    <a:lstStyle/>
-                    <a:p>
-                      <a:r>
-                        <a:rPr lang="en-CA" dirty="0"/>
-                        <a:t>5</a:t>
-                      </a:r>
-                    </a:p>
-                  </a:txBody>
-                  <a:tcPr/>
-                </a:tc>
-                <a:tc>
-                  <a:txBody>
-                    <a:bodyPr/>
-                    <a:lstStyle/>
-                    <a:p>
-                      <a:r>
-                        <a:rPr lang="en-CA" dirty="0" err="1"/>
-                        <a:t>Angle_H</a:t>
-                      </a:r>
-                      <a:endParaRPr lang="en-CA" dirty="0"/>
-                    </a:p>
-                  </a:txBody>
-                  <a:tcPr/>
-                </a:tc>
-                <a:tc>
-                  <a:txBody>
-                    <a:bodyPr/>
-                    <a:lstStyle/>
-                    <a:p>
-                      <a:r>
-                        <a:rPr lang="en-CA" dirty="0" err="1"/>
-                        <a:t>Angle_L</a:t>
-                      </a:r>
-                      <a:endParaRPr lang="en-CA" dirty="0"/>
-                    </a:p>
-                  </a:txBody>
-                  <a:tcPr/>
-                </a:tc>
-                <a:tc>
-                  <a:txBody>
-                    <a:bodyPr/>
-                    <a:lstStyle/>
-                    <a:p>
-                      <a:endParaRPr lang="en-CA" dirty="0"/>
-                    </a:p>
-                  </a:txBody>
-                  <a:tcPr/>
-                </a:tc>
-                <a:extLst>
-                  <a:ext uri="{0D108BD9-81ED-4DB2-BD59-A6C34878D82A}">
-                    <a16:rowId xmlns:a16="http://schemas.microsoft.com/office/drawing/2014/main" val="3567386369"/>
-                  </a:ext>
-                </a:extLst>
-              </a:tr>
-              <a:tr h="370840">
-                <a:tc>
-                  <a:txBody>
-                    <a:bodyPr/>
-                    <a:lstStyle/>
-                    <a:p>
-                      <a:r>
-                        <a:rPr lang="en-CA" dirty="0"/>
-                        <a:t>Upper Position</a:t>
-                      </a:r>
-                    </a:p>
-                  </a:txBody>
-                  <a:tcPr/>
-                </a:tc>
-                <a:tc>
-                  <a:txBody>
-                    <a:bodyPr/>
-                    <a:lstStyle/>
-                    <a:p>
-                      <a:r>
-                        <a:rPr lang="en-CA" dirty="0"/>
-                        <a:t>6</a:t>
-                      </a:r>
-                    </a:p>
-                  </a:txBody>
-                  <a:tcPr/>
-                </a:tc>
-                <a:tc>
-                  <a:txBody>
-                    <a:bodyPr/>
-                    <a:lstStyle/>
-                    <a:p>
-                      <a:r>
-                        <a:rPr lang="en-CA" dirty="0" err="1"/>
-                        <a:t>Angle_H</a:t>
-                      </a:r>
-                      <a:endParaRPr lang="en-CA" dirty="0"/>
-                    </a:p>
-                  </a:txBody>
-                  <a:tcPr/>
-                </a:tc>
-                <a:tc>
-                  <a:txBody>
-                    <a:bodyPr/>
-                    <a:lstStyle/>
-                    <a:p>
-                      <a:r>
-                        <a:rPr lang="en-CA" dirty="0" err="1"/>
-                        <a:t>Angle_L</a:t>
-                      </a:r>
-                      <a:endParaRPr lang="en-CA" dirty="0"/>
-                    </a:p>
-                  </a:txBody>
-                  <a:tcPr/>
-                </a:tc>
-                <a:tc>
-                  <a:txBody>
-                    <a:bodyPr/>
-                    <a:lstStyle/>
-                    <a:p>
-                      <a:endParaRPr lang="en-CA"/>
-                    </a:p>
-                  </a:txBody>
-                  <a:tcPr/>
-                </a:tc>
-                <a:extLst>
-                  <a:ext uri="{0D108BD9-81ED-4DB2-BD59-A6C34878D82A}">
-                    <a16:rowId xmlns:a16="http://schemas.microsoft.com/office/drawing/2014/main" val="3516042039"/>
-                  </a:ext>
-                </a:extLst>
-              </a:tr>
-              <a:tr h="370840">
-                <a:tc>
-                  <a:txBody>
-                    <a:bodyPr/>
-                    <a:lstStyle/>
-                    <a:p>
-                      <a:endParaRPr lang="en-CA"/>
-                    </a:p>
-                  </a:txBody>
-                  <a:tcPr/>
-                </a:tc>
-                <a:tc>
-                  <a:txBody>
-                    <a:bodyPr/>
-                    <a:lstStyle/>
-                    <a:p>
-                      <a:r>
-                        <a:rPr lang="en-CA" dirty="0"/>
-                        <a:t>7</a:t>
-                      </a:r>
-                    </a:p>
-                  </a:txBody>
-                  <a:tcPr/>
-                </a:tc>
-                <a:tc>
-                  <a:txBody>
-                    <a:bodyPr/>
-                    <a:lstStyle/>
-                    <a:p>
-                      <a:endParaRPr lang="en-CA"/>
-                    </a:p>
-                  </a:txBody>
-                  <a:tcPr/>
-                </a:tc>
-                <a:tc>
-                  <a:txBody>
-                    <a:bodyPr/>
-                    <a:lstStyle/>
-                    <a:p>
-                      <a:endParaRPr lang="en-CA"/>
-                    </a:p>
-                  </a:txBody>
-                  <a:tcPr/>
-                </a:tc>
-                <a:tc>
-                  <a:txBody>
-                    <a:bodyPr/>
-                    <a:lstStyle/>
-                    <a:p>
-                      <a:endParaRPr lang="en-CA"/>
-                    </a:p>
-                  </a:txBody>
-                  <a:tcPr/>
-                </a:tc>
-                <a:extLst>
-                  <a:ext uri="{0D108BD9-81ED-4DB2-BD59-A6C34878D82A}">
-                    <a16:rowId xmlns:a16="http://schemas.microsoft.com/office/drawing/2014/main" val="373341903"/>
-                  </a:ext>
-                </a:extLst>
-              </a:tr>
-              <a:tr h="370840">
-                <a:tc>
-                  <a:txBody>
-                    <a:bodyPr/>
-                    <a:lstStyle/>
-                    <a:p>
-                      <a:endParaRPr lang="en-CA"/>
-                    </a:p>
-                  </a:txBody>
-                  <a:tcPr/>
-                </a:tc>
-                <a:tc>
-                  <a:txBody>
-                    <a:bodyPr/>
-                    <a:lstStyle/>
-                    <a:p>
-                      <a:r>
-                        <a:rPr lang="en-CA" dirty="0"/>
-                        <a:t>8</a:t>
-                      </a:r>
-                    </a:p>
-                  </a:txBody>
-                  <a:tcPr/>
-                </a:tc>
-                <a:tc>
-                  <a:txBody>
-                    <a:bodyPr/>
-                    <a:lstStyle/>
-                    <a:p>
-                      <a:endParaRPr lang="en-CA"/>
-                    </a:p>
-                  </a:txBody>
-                  <a:tcPr/>
-                </a:tc>
-                <a:tc>
-                  <a:txBody>
-                    <a:bodyPr/>
-                    <a:lstStyle/>
-                    <a:p>
-                      <a:endParaRPr lang="en-CA"/>
-                    </a:p>
-                  </a:txBody>
-                  <a:tcPr/>
-                </a:tc>
-                <a:tc>
-                  <a:txBody>
-                    <a:bodyPr/>
-                    <a:lstStyle/>
-                    <a:p>
-                      <a:endParaRPr lang="en-CA" dirty="0"/>
-                    </a:p>
-                  </a:txBody>
-                  <a:tcPr/>
-                </a:tc>
-                <a:extLst>
-                  <a:ext uri="{0D108BD9-81ED-4DB2-BD59-A6C34878D82A}">
-                    <a16:rowId xmlns:a16="http://schemas.microsoft.com/office/drawing/2014/main" val="3256791078"/>
-                  </a:ext>
-                </a:extLst>
-              </a:tr>
-            </a:tbl>
-          </a:graphicData>
-        </a:graphic>
-      </p:graphicFrame>
-    </p:spTree>
-    <p:extLst>
-      <p:ext uri="{BB962C8B-B14F-4D97-AF65-F5344CB8AC3E}">
-        <p14:creationId xmlns:p14="http://schemas.microsoft.com/office/powerpoint/2010/main" val="2416238504"/>
       </p:ext>
     </p:extLst>
   </p:cSld>

</xml_diff>